<commit_message>
Update to slides + initial PDF version of slides
</commit_message>
<xml_diff>
--- a/Adaptive Clocking Techniques for SoC Supply Droop Response.pptx
+++ b/Adaptive Clocking Techniques for SoC Supply Droop Response.pptx
@@ -5,7 +5,7 @@
     <p:sldMasterId id="2147483648" r:id="rId1"/>
   </p:sldMasterIdLst>
   <p:notesMasterIdLst>
-    <p:notesMasterId r:id="rId13"/>
+    <p:notesMasterId r:id="rId15"/>
   </p:notesMasterIdLst>
   <p:sldIdLst>
     <p:sldId id="256" r:id="rId2"/>
@@ -19,6 +19,8 @@
     <p:sldId id="263" r:id="rId10"/>
     <p:sldId id="264" r:id="rId11"/>
     <p:sldId id="265" r:id="rId12"/>
+    <p:sldId id="267" r:id="rId13"/>
+    <p:sldId id="268" r:id="rId14"/>
   </p:sldIdLst>
   <p:sldSz cx="12192000" cy="6858000"/>
   <p:notesSz cx="6858000" cy="9144000"/>
@@ -3843,7 +3845,10 @@
           <a:bodyPr/>
           <a:lstStyle/>
           <a:p>
-            <a:endParaRPr lang="en-CA"/>
+            <a:r>
+              <a:rPr lang="en-CA" dirty="0"/>
+              <a:t>RTL Implementation?</a:t>
+            </a:r>
           </a:p>
         </p:txBody>
       </p:sp>
@@ -3952,35 +3957,48 @@
           <a:bodyPr/>
           <a:lstStyle/>
           <a:p>
-            <a:endParaRPr lang="en-CA"/>
-          </a:p>
-        </p:txBody>
-      </p:sp>
-      <p:sp>
-        <p:nvSpPr>
-          <p:cNvPr id="3" name="Content Placeholder 2">
-            <a:extLst>
-              <a:ext uri="{FF2B5EF4-FFF2-40B4-BE49-F238E27FC236}">
-                <a16:creationId xmlns:a16="http://schemas.microsoft.com/office/drawing/2014/main" id="{24592F20-3B84-44E8-9E30-571C8E71D35B}"/>
-              </a:ext>
-            </a:extLst>
-          </p:cNvPr>
-          <p:cNvSpPr>
-            <a:spLocks noGrp="1"/>
-          </p:cNvSpPr>
+            <a:r>
+              <a:rPr lang="en-CA" dirty="0"/>
+              <a:t>Backend implementation</a:t>
+            </a:r>
+          </a:p>
+        </p:txBody>
+      </p:sp>
+      <p:pic>
+        <p:nvPicPr>
+          <p:cNvPr id="6" name="Content Placeholder 5" descr="A picture containing clock&#10;&#10;Description automatically generated">
+            <a:extLst>
+              <a:ext uri="{FF2B5EF4-FFF2-40B4-BE49-F238E27FC236}">
+                <a16:creationId xmlns:a16="http://schemas.microsoft.com/office/drawing/2014/main" id="{E36A4E1C-89E9-4DE4-99DD-AE534A6584B7}"/>
+              </a:ext>
+            </a:extLst>
+          </p:cNvPr>
+          <p:cNvPicPr>
+            <a:picLocks noGrp="1" noChangeAspect="1"/>
+          </p:cNvPicPr>
           <p:nvPr>
             <p:ph idx="1"/>
           </p:nvPr>
-        </p:nvSpPr>
-        <p:spPr/>
-        <p:txBody>
-          <a:bodyPr/>
-          <a:lstStyle/>
-          <a:p>
-            <a:endParaRPr lang="en-CA"/>
-          </a:p>
-        </p:txBody>
-      </p:sp>
+        </p:nvPicPr>
+        <p:blipFill>
+          <a:blip r:embed="rId2">
+            <a:extLst>
+              <a:ext uri="{28A0092B-C50C-407E-A947-70E740481C1C}">
+                <a14:useLocalDpi xmlns:a14="http://schemas.microsoft.com/office/drawing/2010/main" val="0"/>
+              </a:ext>
+            </a:extLst>
+          </a:blip>
+          <a:stretch>
+            <a:fillRect/>
+          </a:stretch>
+        </p:blipFill>
+        <p:spPr>
+          <a:xfrm>
+            <a:off x="3925977" y="1825625"/>
+            <a:ext cx="4340045" cy="4351338"/>
+          </a:xfrm>
+        </p:spPr>
+      </p:pic>
       <p:sp>
         <p:nvSpPr>
           <p:cNvPr id="4" name="Slide Number Placeholder 3">
@@ -4014,6 +4032,237 @@
     <p:extLst>
       <p:ext uri="{BB962C8B-B14F-4D97-AF65-F5344CB8AC3E}">
         <p14:creationId xmlns:p14="http://schemas.microsoft.com/office/powerpoint/2010/main" val="2400215686"/>
+      </p:ext>
+    </p:extLst>
+  </p:cSld>
+  <p:clrMapOvr>
+    <a:masterClrMapping/>
+  </p:clrMapOvr>
+</p:sld>
+</file>
+
+<file path=ppt/slides/slide12.xml><?xml version="1.0" encoding="utf-8"?>
+<p:sld xmlns:a="http://schemas.openxmlformats.org/drawingml/2006/main" xmlns:r="http://schemas.openxmlformats.org/officeDocument/2006/relationships" xmlns:p="http://schemas.openxmlformats.org/presentationml/2006/main">
+  <p:cSld>
+    <p:spTree>
+      <p:nvGrpSpPr>
+        <p:cNvPr id="1" name=""/>
+        <p:cNvGrpSpPr/>
+        <p:nvPr/>
+      </p:nvGrpSpPr>
+      <p:grpSpPr>
+        <a:xfrm>
+          <a:off x="0" y="0"/>
+          <a:ext cx="0" cy="0"/>
+          <a:chOff x="0" y="0"/>
+          <a:chExt cx="0" cy="0"/>
+        </a:xfrm>
+      </p:grpSpPr>
+      <p:sp>
+        <p:nvSpPr>
+          <p:cNvPr id="2" name="Title 1">
+            <a:extLst>
+              <a:ext uri="{FF2B5EF4-FFF2-40B4-BE49-F238E27FC236}">
+                <a16:creationId xmlns:a16="http://schemas.microsoft.com/office/drawing/2014/main" id="{AD1D0C48-24AD-42ED-B64A-CA9B35CA7DA8}"/>
+              </a:ext>
+            </a:extLst>
+          </p:cNvPr>
+          <p:cNvSpPr>
+            <a:spLocks noGrp="1"/>
+          </p:cNvSpPr>
+          <p:nvPr>
+            <p:ph type="title"/>
+          </p:nvPr>
+        </p:nvSpPr>
+        <p:spPr/>
+        <p:txBody>
+          <a:bodyPr/>
+          <a:lstStyle/>
+          <a:p>
+            <a:r>
+              <a:rPr lang="en-CA" dirty="0"/>
+              <a:t>Comparison to Prior Works</a:t>
+            </a:r>
+          </a:p>
+        </p:txBody>
+      </p:sp>
+      <p:pic>
+        <p:nvPicPr>
+          <p:cNvPr id="7" name="Content Placeholder 6">
+            <a:extLst>
+              <a:ext uri="{FF2B5EF4-FFF2-40B4-BE49-F238E27FC236}">
+                <a16:creationId xmlns:a16="http://schemas.microsoft.com/office/drawing/2014/main" id="{7CFE1F19-16C6-4074-8615-4B977D0CBFDC}"/>
+              </a:ext>
+            </a:extLst>
+          </p:cNvPr>
+          <p:cNvPicPr>
+            <a:picLocks noGrp="1" noChangeAspect="1"/>
+          </p:cNvPicPr>
+          <p:nvPr>
+            <p:ph idx="1"/>
+          </p:nvPr>
+        </p:nvPicPr>
+        <p:blipFill>
+          <a:blip r:embed="rId2"/>
+          <a:stretch>
+            <a:fillRect/>
+          </a:stretch>
+        </p:blipFill>
+        <p:spPr>
+          <a:xfrm>
+            <a:off x="2471231" y="2251621"/>
+            <a:ext cx="7249537" cy="3543795"/>
+          </a:xfrm>
+          <a:prstGeom prst="rect">
+            <a:avLst/>
+          </a:prstGeom>
+        </p:spPr>
+      </p:pic>
+      <p:sp>
+        <p:nvSpPr>
+          <p:cNvPr id="4" name="Slide Number Placeholder 3">
+            <a:extLst>
+              <a:ext uri="{FF2B5EF4-FFF2-40B4-BE49-F238E27FC236}">
+                <a16:creationId xmlns:a16="http://schemas.microsoft.com/office/drawing/2014/main" id="{16D7F848-C36E-45AE-B61D-26C6DC0910BB}"/>
+              </a:ext>
+            </a:extLst>
+          </p:cNvPr>
+          <p:cNvSpPr>
+            <a:spLocks noGrp="1"/>
+          </p:cNvSpPr>
+          <p:nvPr>
+            <p:ph type="sldNum" sz="quarter" idx="12"/>
+          </p:nvPr>
+        </p:nvSpPr>
+        <p:spPr/>
+        <p:txBody>
+          <a:bodyPr/>
+          <a:lstStyle/>
+          <a:p>
+            <a:fld id="{66E8B406-E245-48DB-9129-C291FE31300E}" type="slidenum">
+              <a:rPr lang="en-CA" smtClean="0"/>
+              <a:t>12</a:t>
+            </a:fld>
+            <a:endParaRPr lang="en-CA"/>
+          </a:p>
+        </p:txBody>
+      </p:sp>
+    </p:spTree>
+    <p:extLst>
+      <p:ext uri="{BB962C8B-B14F-4D97-AF65-F5344CB8AC3E}">
+        <p14:creationId xmlns:p14="http://schemas.microsoft.com/office/powerpoint/2010/main" val="1124748770"/>
+      </p:ext>
+    </p:extLst>
+  </p:cSld>
+  <p:clrMapOvr>
+    <a:masterClrMapping/>
+  </p:clrMapOvr>
+</p:sld>
+</file>
+
+<file path=ppt/slides/slide13.xml><?xml version="1.0" encoding="utf-8"?>
+<p:sld xmlns:a="http://schemas.openxmlformats.org/drawingml/2006/main" xmlns:r="http://schemas.openxmlformats.org/officeDocument/2006/relationships" xmlns:p="http://schemas.openxmlformats.org/presentationml/2006/main">
+  <p:cSld>
+    <p:spTree>
+      <p:nvGrpSpPr>
+        <p:cNvPr id="1" name=""/>
+        <p:cNvGrpSpPr/>
+        <p:nvPr/>
+      </p:nvGrpSpPr>
+      <p:grpSpPr>
+        <a:xfrm>
+          <a:off x="0" y="0"/>
+          <a:ext cx="0" cy="0"/>
+          <a:chOff x="0" y="0"/>
+          <a:chExt cx="0" cy="0"/>
+        </a:xfrm>
+      </p:grpSpPr>
+      <p:sp>
+        <p:nvSpPr>
+          <p:cNvPr id="2" name="Title 1">
+            <a:extLst>
+              <a:ext uri="{FF2B5EF4-FFF2-40B4-BE49-F238E27FC236}">
+                <a16:creationId xmlns:a16="http://schemas.microsoft.com/office/drawing/2014/main" id="{46B4BD72-DAAD-43BD-8BE4-93D418C6D0A1}"/>
+              </a:ext>
+            </a:extLst>
+          </p:cNvPr>
+          <p:cNvSpPr>
+            <a:spLocks noGrp="1"/>
+          </p:cNvSpPr>
+          <p:nvPr>
+            <p:ph type="title"/>
+          </p:nvPr>
+        </p:nvSpPr>
+        <p:spPr/>
+        <p:txBody>
+          <a:bodyPr/>
+          <a:lstStyle/>
+          <a:p>
+            <a:r>
+              <a:rPr lang="en-CA"/>
+              <a:t>Summary</a:t>
+            </a:r>
+          </a:p>
+        </p:txBody>
+      </p:sp>
+      <p:sp>
+        <p:nvSpPr>
+          <p:cNvPr id="3" name="Content Placeholder 2">
+            <a:extLst>
+              <a:ext uri="{FF2B5EF4-FFF2-40B4-BE49-F238E27FC236}">
+                <a16:creationId xmlns:a16="http://schemas.microsoft.com/office/drawing/2014/main" id="{32BDD3E6-70F4-47FE-83D1-79158948D2E6}"/>
+              </a:ext>
+            </a:extLst>
+          </p:cNvPr>
+          <p:cNvSpPr>
+            <a:spLocks noGrp="1"/>
+          </p:cNvSpPr>
+          <p:nvPr>
+            <p:ph idx="1"/>
+          </p:nvPr>
+        </p:nvSpPr>
+        <p:spPr/>
+        <p:txBody>
+          <a:bodyPr/>
+          <a:lstStyle/>
+          <a:p>
+            <a:endParaRPr lang="en-CA"/>
+          </a:p>
+        </p:txBody>
+      </p:sp>
+      <p:sp>
+        <p:nvSpPr>
+          <p:cNvPr id="4" name="Slide Number Placeholder 3">
+            <a:extLst>
+              <a:ext uri="{FF2B5EF4-FFF2-40B4-BE49-F238E27FC236}">
+                <a16:creationId xmlns:a16="http://schemas.microsoft.com/office/drawing/2014/main" id="{2202516C-A4D8-4605-AAB5-AA7497130891}"/>
+              </a:ext>
+            </a:extLst>
+          </p:cNvPr>
+          <p:cNvSpPr>
+            <a:spLocks noGrp="1"/>
+          </p:cNvSpPr>
+          <p:nvPr>
+            <p:ph type="sldNum" sz="quarter" idx="12"/>
+          </p:nvPr>
+        </p:nvSpPr>
+        <p:spPr/>
+        <p:txBody>
+          <a:bodyPr/>
+          <a:lstStyle/>
+          <a:p>
+            <a:fld id="{66E8B406-E245-48DB-9129-C291FE31300E}" type="slidenum">
+              <a:rPr lang="en-CA" smtClean="0"/>
+              <a:t>13</a:t>
+            </a:fld>
+            <a:endParaRPr lang="en-CA"/>
+          </a:p>
+        </p:txBody>
+      </p:sp>
+    </p:spTree>
+    <p:extLst>
+      <p:ext uri="{BB962C8B-B14F-4D97-AF65-F5344CB8AC3E}">
+        <p14:creationId xmlns:p14="http://schemas.microsoft.com/office/powerpoint/2010/main" val="3879942880"/>
       </p:ext>
     </p:extLst>
   </p:cSld>
@@ -5040,10 +5289,10 @@
       </p:sp>
       <p:pic>
         <p:nvPicPr>
-          <p:cNvPr id="6" name="Content Placeholder 5" descr="A screenshot of a cell phone&#10;&#10;Description automatically generated">
-            <a:extLst>
-              <a:ext uri="{FF2B5EF4-FFF2-40B4-BE49-F238E27FC236}">
-                <a16:creationId xmlns:a16="http://schemas.microsoft.com/office/drawing/2014/main" id="{CBDD3A01-8677-4AC9-80C2-1456E3145A5F}"/>
+          <p:cNvPr id="17" name="Content Placeholder 16" descr="A screenshot of a cell phone&#10;&#10;Description automatically generated">
+            <a:extLst>
+              <a:ext uri="{FF2B5EF4-FFF2-40B4-BE49-F238E27FC236}">
+                <a16:creationId xmlns:a16="http://schemas.microsoft.com/office/drawing/2014/main" id="{94B660E4-57AF-4AE6-9684-F15362C1F714}"/>
               </a:ext>
             </a:extLst>
           </p:cNvPr>
@@ -5051,7 +5300,7 @@
             <a:picLocks noGrp="1" noChangeAspect="1"/>
           </p:cNvPicPr>
           <p:nvPr>
-            <p:ph idx="1"/>
+            <p:ph sz="half" idx="2"/>
           </p:nvPr>
         </p:nvPicPr>
         <p:blipFill>
@@ -5068,8 +5317,8 @@
         </p:blipFill>
         <p:spPr>
           <a:xfrm>
-            <a:off x="3205942" y="1396321"/>
-            <a:ext cx="5780116" cy="3669910"/>
+            <a:off x="6794268" y="1795341"/>
+            <a:ext cx="3937464" cy="2499974"/>
           </a:xfrm>
         </p:spPr>
       </p:pic>
@@ -5116,7 +5365,7 @@
         </p:nvSpPr>
         <p:spPr>
           <a:xfrm>
-            <a:off x="2266604" y="5341958"/>
+            <a:off x="2806931" y="4635374"/>
             <a:ext cx="7658792" cy="369332"/>
           </a:xfrm>
           <a:prstGeom prst="rect">
@@ -5194,7 +5443,7 @@
         </p:nvSpPr>
         <p:spPr>
           <a:xfrm>
-            <a:off x="2266604" y="5341958"/>
+            <a:off x="2806931" y="4635374"/>
             <a:ext cx="1773381" cy="369332"/>
           </a:xfrm>
           <a:prstGeom prst="rect">
@@ -5242,7 +5491,7 @@
         </p:nvSpPr>
         <p:spPr>
           <a:xfrm>
-            <a:off x="2266604" y="5802351"/>
+            <a:off x="2806931" y="5095767"/>
             <a:ext cx="7658792" cy="369332"/>
           </a:xfrm>
           <a:prstGeom prst="rect">
@@ -5314,7 +5563,7 @@
         </p:nvSpPr>
         <p:spPr>
           <a:xfrm>
-            <a:off x="2266604" y="5802351"/>
+            <a:off x="2806931" y="5095767"/>
             <a:ext cx="1773381" cy="369332"/>
           </a:xfrm>
           <a:prstGeom prst="rect">
@@ -5352,6 +5601,41 @@
           </a:p>
         </p:txBody>
       </p:sp>
+      <p:pic>
+        <p:nvPicPr>
+          <p:cNvPr id="15" name="Content Placeholder 14" descr="A screenshot of a cell phone&#10;&#10;Description automatically generated">
+            <a:extLst>
+              <a:ext uri="{FF2B5EF4-FFF2-40B4-BE49-F238E27FC236}">
+                <a16:creationId xmlns:a16="http://schemas.microsoft.com/office/drawing/2014/main" id="{A03BA69D-8615-43AA-A6F3-B21EA95B5534}"/>
+              </a:ext>
+            </a:extLst>
+          </p:cNvPr>
+          <p:cNvPicPr>
+            <a:picLocks noGrp="1" noChangeAspect="1"/>
+          </p:cNvPicPr>
+          <p:nvPr>
+            <p:ph sz="half" idx="1"/>
+          </p:nvPr>
+        </p:nvPicPr>
+        <p:blipFill>
+          <a:blip r:embed="rId3">
+            <a:extLst>
+              <a:ext uri="{28A0092B-C50C-407E-A947-70E740481C1C}">
+                <a14:useLocalDpi xmlns:a14="http://schemas.microsoft.com/office/drawing/2010/main" val="0"/>
+              </a:ext>
+            </a:extLst>
+          </a:blip>
+          <a:stretch>
+            <a:fillRect/>
+          </a:stretch>
+        </p:blipFill>
+        <p:spPr>
+          <a:xfrm>
+            <a:off x="838200" y="2184904"/>
+            <a:ext cx="5181600" cy="1720847"/>
+          </a:xfrm>
+        </p:spPr>
+      </p:pic>
     </p:spTree>
     <p:extLst>
       <p:ext uri="{BB962C8B-B14F-4D97-AF65-F5344CB8AC3E}">
@@ -5405,7 +5689,14 @@
           <a:p>
             <a:r>
               <a:rPr lang="en-CA" dirty="0"/>
-              <a:t>PLL-based adaptive clocking </a:t>
+              <a:t>PLL-based adaptive clocking</a:t>
+            </a:r>
+            <a:br>
+              <a:rPr lang="en-CA" dirty="0"/>
+            </a:br>
+            <a:r>
+              <a:rPr lang="en-CA" dirty="0"/>
+              <a:t>Hashimoto et al., JSSC 2015 (20nm CMOS) </a:t>
             </a:r>
           </a:p>
         </p:txBody>
@@ -5511,10 +5802,10 @@
       </p:pic>
       <p:sp>
         <p:nvSpPr>
-          <p:cNvPr id="27" name="TextBox 26">
-            <a:extLst>
-              <a:ext uri="{FF2B5EF4-FFF2-40B4-BE49-F238E27FC236}">
-                <a16:creationId xmlns:a16="http://schemas.microsoft.com/office/drawing/2014/main" id="{35AA3BBC-0449-4D8F-985F-181574E676A3}"/>
+          <p:cNvPr id="28" name="TextBox 27">
+            <a:extLst>
+              <a:ext uri="{FF2B5EF4-FFF2-40B4-BE49-F238E27FC236}">
+                <a16:creationId xmlns:a16="http://schemas.microsoft.com/office/drawing/2014/main" id="{669F8D5C-CF2E-4A64-8473-6AE13BCEDBB7}"/>
               </a:ext>
             </a:extLst>
           </p:cNvPr>
@@ -5523,8 +5814,8 @@
         </p:nvSpPr>
         <p:spPr>
           <a:xfrm>
-            <a:off x="7909559" y="4329208"/>
-            <a:ext cx="3444241" cy="307777"/>
+            <a:off x="838193" y="4773392"/>
+            <a:ext cx="10515608" cy="1477328"/>
           </a:xfrm>
           <a:prstGeom prst="rect">
             <a:avLst/>
@@ -5537,11 +5828,136 @@
           </a:bodyPr>
           <a:lstStyle/>
           <a:p>
-            <a:pPr algn="r"/>
-            <a:r>
-              <a:rPr lang="en-CA" sz="1400" dirty="0"/>
-              <a:t>T. Hashimoto et al. JSSC 2015</a:t>
-            </a:r>
+            <a:pPr marL="285750" indent="-285750">
+              <a:buFont typeface="Arial" panose="020B0604020202020204" pitchFamily="34" charset="0"/>
+              <a:buChar char="•"/>
+            </a:pPr>
+            <a:r>
+              <a:rPr lang="el-GR" dirty="0">
+                <a:latin typeface="Calibri" panose="020F0502020204030204" pitchFamily="34" charset="0"/>
+                <a:cs typeface="Calibri" panose="020F0502020204030204" pitchFamily="34" charset="0"/>
+              </a:rPr>
+              <a:t>Δ</a:t>
+            </a:r>
+            <a:r>
+              <a:rPr lang="en-CA" dirty="0">
+                <a:latin typeface="Calibri" panose="020F0502020204030204" pitchFamily="34" charset="0"/>
+                <a:cs typeface="Calibri" panose="020F0502020204030204" pitchFamily="34" charset="0"/>
+              </a:rPr>
+              <a:t>F</a:t>
+            </a:r>
+            <a:r>
+              <a:rPr lang="en-CA" baseline="-25000" dirty="0">
+                <a:latin typeface="Calibri" panose="020F0502020204030204" pitchFamily="34" charset="0"/>
+                <a:cs typeface="Calibri" panose="020F0502020204030204" pitchFamily="34" charset="0"/>
+              </a:rPr>
+              <a:t>CODE</a:t>
+            </a:r>
+            <a:r>
+              <a:rPr lang="en-CA" dirty="0">
+                <a:latin typeface="Calibri" panose="020F0502020204030204" pitchFamily="34" charset="0"/>
+                <a:cs typeface="Calibri" panose="020F0502020204030204" pitchFamily="34" charset="0"/>
+              </a:rPr>
+              <a:t> immediately adjusts DCO in response to sudden droop </a:t>
+            </a:r>
+          </a:p>
+          <a:p>
+            <a:pPr marL="742950" lvl="1" indent="-285750">
+              <a:buFont typeface="Arial" panose="020B0604020202020204" pitchFamily="34" charset="0"/>
+              <a:buChar char="•"/>
+            </a:pPr>
+            <a:r>
+              <a:rPr lang="en-CA" dirty="0">
+                <a:latin typeface="Calibri" panose="020F0502020204030204" pitchFamily="34" charset="0"/>
+                <a:cs typeface="Calibri" panose="020F0502020204030204" pitchFamily="34" charset="0"/>
+              </a:rPr>
+              <a:t>Sub-cycle logic latency </a:t>
+            </a:r>
+            <a:r>
+              <a:rPr lang="en-CA" dirty="0">
+                <a:latin typeface="Calibri" panose="020F0502020204030204" pitchFamily="34" charset="0"/>
+                <a:cs typeface="Calibri" panose="020F0502020204030204" pitchFamily="34" charset="0"/>
+                <a:sym typeface="Wingdings" panose="05000000000000000000" pitchFamily="2" charset="2"/>
+              </a:rPr>
+              <a:t>+ thermometer-coded logic (single AND gate)</a:t>
+            </a:r>
+            <a:endParaRPr lang="en-CA" dirty="0">
+              <a:latin typeface="Calibri" panose="020F0502020204030204" pitchFamily="34" charset="0"/>
+              <a:cs typeface="Calibri" panose="020F0502020204030204" pitchFamily="34" charset="0"/>
+            </a:endParaRPr>
+          </a:p>
+          <a:p>
+            <a:pPr marL="285750" indent="-285750">
+              <a:buFont typeface="Arial" panose="020B0604020202020204" pitchFamily="34" charset="0"/>
+              <a:buChar char="•"/>
+            </a:pPr>
+            <a:r>
+              <a:rPr lang="en-CA" dirty="0"/>
+              <a:t>N</a:t>
+            </a:r>
+            <a:r>
+              <a:rPr lang="en-CA" baseline="-25000" dirty="0"/>
+              <a:t>DIV</a:t>
+            </a:r>
+            <a:r>
+              <a:rPr lang="en-CA" baseline="30000" dirty="0"/>
+              <a:t>SYNC</a:t>
+            </a:r>
+            <a:r>
+              <a:rPr lang="en-CA" dirty="0"/>
+              <a:t> filters droop through non-linear filter + moving average to track slower droops</a:t>
+            </a:r>
+          </a:p>
+          <a:p>
+            <a:pPr marL="742950" lvl="1" indent="-285750">
+              <a:buFont typeface="Arial" panose="020B0604020202020204" pitchFamily="34" charset="0"/>
+              <a:buChar char="•"/>
+            </a:pPr>
+            <a:r>
+              <a:rPr lang="en-CA" dirty="0"/>
+              <a:t>Helps re-lock PLL to nominal frequency after droop event</a:t>
+            </a:r>
+          </a:p>
+          <a:p>
+            <a:pPr marL="285750" indent="-285750">
+              <a:buFont typeface="Arial" panose="020B0604020202020204" pitchFamily="34" charset="0"/>
+              <a:buChar char="•"/>
+            </a:pPr>
+            <a:r>
+              <a:rPr lang="en-CA" dirty="0"/>
+              <a:t>Low-latency logic claimed to improve </a:t>
+            </a:r>
+            <a:r>
+              <a:rPr lang="en-CA" dirty="0" err="1"/>
+              <a:t>f</a:t>
+            </a:r>
+            <a:r>
+              <a:rPr lang="en-CA" baseline="-25000" dirty="0" err="1"/>
+              <a:t>MAX</a:t>
+            </a:r>
+            <a:r>
+              <a:rPr lang="en-CA" dirty="0"/>
+              <a:t> by 7.5% (4.65GHz </a:t>
+            </a:r>
+            <a:r>
+              <a:rPr lang="en-CA" dirty="0">
+                <a:sym typeface="Wingdings" panose="05000000000000000000" pitchFamily="2" charset="2"/>
+              </a:rPr>
+              <a:t> 5.00GHz) or 5% V</a:t>
+            </a:r>
+            <a:r>
+              <a:rPr lang="en-CA" baseline="-25000" dirty="0">
+                <a:sym typeface="Wingdings" panose="05000000000000000000" pitchFamily="2" charset="2"/>
+              </a:rPr>
+              <a:t>MIN</a:t>
+            </a:r>
+            <a:r>
+              <a:rPr lang="en-CA" dirty="0">
+                <a:sym typeface="Wingdings" panose="05000000000000000000" pitchFamily="2" charset="2"/>
+              </a:rPr>
+              <a:t> reduction at 4.65 GHz</a:t>
+            </a:r>
+            <a:endParaRPr lang="en-CA" dirty="0"/>
           </a:p>
         </p:txBody>
       </p:sp>
@@ -5593,38 +6009,60 @@
         </p:nvSpPr>
         <p:spPr/>
         <p:txBody>
-          <a:bodyPr/>
-          <a:lstStyle/>
-          <a:p>
-            <a:endParaRPr lang="en-CA"/>
-          </a:p>
-        </p:txBody>
-      </p:sp>
-      <p:sp>
-        <p:nvSpPr>
-          <p:cNvPr id="3" name="Content Placeholder 2">
-            <a:extLst>
-              <a:ext uri="{FF2B5EF4-FFF2-40B4-BE49-F238E27FC236}">
-                <a16:creationId xmlns:a16="http://schemas.microsoft.com/office/drawing/2014/main" id="{50D372BC-6DCF-496D-B5FD-9440CAC7C9C7}"/>
-              </a:ext>
-            </a:extLst>
-          </p:cNvPr>
-          <p:cNvSpPr>
-            <a:spLocks noGrp="1"/>
-          </p:cNvSpPr>
+          <a:bodyPr>
+            <a:normAutofit/>
+          </a:bodyPr>
+          <a:lstStyle/>
+          <a:p>
+            <a:r>
+              <a:rPr lang="en-CA" dirty="0"/>
+              <a:t>Adaptive clock distribution</a:t>
+            </a:r>
+            <a:br>
+              <a:rPr lang="en-CA" dirty="0"/>
+            </a:br>
+            <a:r>
+              <a:rPr lang="en-CA" dirty="0"/>
+              <a:t> Wilcox et al., JSSC 2015 (28nm CMOS)</a:t>
+            </a:r>
+          </a:p>
+        </p:txBody>
+      </p:sp>
+      <p:pic>
+        <p:nvPicPr>
+          <p:cNvPr id="8" name="Content Placeholder 7" descr="A close up of a logo&#10;&#10;Description automatically generated">
+            <a:extLst>
+              <a:ext uri="{FF2B5EF4-FFF2-40B4-BE49-F238E27FC236}">
+                <a16:creationId xmlns:a16="http://schemas.microsoft.com/office/drawing/2014/main" id="{38E7CC62-C892-47C7-AE7B-0E73532B13C2}"/>
+              </a:ext>
+            </a:extLst>
+          </p:cNvPr>
+          <p:cNvPicPr>
+            <a:picLocks noGrp="1" noChangeAspect="1"/>
+          </p:cNvPicPr>
           <p:nvPr>
             <p:ph idx="1"/>
           </p:nvPr>
-        </p:nvSpPr>
-        <p:spPr/>
-        <p:txBody>
-          <a:bodyPr/>
-          <a:lstStyle/>
-          <a:p>
-            <a:endParaRPr lang="en-CA"/>
-          </a:p>
-        </p:txBody>
-      </p:sp>
+        </p:nvPicPr>
+        <p:blipFill>
+          <a:blip r:embed="rId2">
+            <a:extLst>
+              <a:ext uri="{28A0092B-C50C-407E-A947-70E740481C1C}">
+                <a14:useLocalDpi xmlns:a14="http://schemas.microsoft.com/office/drawing/2010/main" val="0"/>
+              </a:ext>
+            </a:extLst>
+          </a:blip>
+          <a:stretch>
+            <a:fillRect/>
+          </a:stretch>
+        </p:blipFill>
+        <p:spPr>
+          <a:xfrm>
+            <a:off x="4202294" y="1691875"/>
+            <a:ext cx="3787406" cy="3472842"/>
+          </a:xfrm>
+        </p:spPr>
+      </p:pic>
       <p:sp>
         <p:nvSpPr>
           <p:cNvPr id="4" name="Slide Number Placeholder 3">
@@ -5651,6 +6089,113 @@
               <a:t>7</a:t>
             </a:fld>
             <a:endParaRPr lang="en-CA"/>
+          </a:p>
+        </p:txBody>
+      </p:sp>
+      <p:sp>
+        <p:nvSpPr>
+          <p:cNvPr id="9" name="TextBox 8">
+            <a:extLst>
+              <a:ext uri="{FF2B5EF4-FFF2-40B4-BE49-F238E27FC236}">
+                <a16:creationId xmlns:a16="http://schemas.microsoft.com/office/drawing/2014/main" id="{89210C1D-3A58-4D5C-9316-FEEAF8A2BF0B}"/>
+              </a:ext>
+            </a:extLst>
+          </p:cNvPr>
+          <p:cNvSpPr txBox="1"/>
+          <p:nvPr/>
+        </p:nvSpPr>
+        <p:spPr>
+          <a:xfrm>
+            <a:off x="838200" y="5332156"/>
+            <a:ext cx="10515608" cy="1200329"/>
+          </a:xfrm>
+          <a:prstGeom prst="rect">
+            <a:avLst/>
+          </a:prstGeom>
+          <a:noFill/>
+        </p:spPr>
+        <p:txBody>
+          <a:bodyPr wrap="square" rtlCol="0">
+            <a:spAutoFit/>
+          </a:bodyPr>
+          <a:lstStyle/>
+          <a:p>
+            <a:pPr marL="285750" indent="-285750">
+              <a:buFont typeface="Arial" panose="020B0604020202020204" pitchFamily="34" charset="0"/>
+              <a:buChar char="•"/>
+            </a:pPr>
+            <a:r>
+              <a:rPr lang="en-CA" dirty="0">
+                <a:latin typeface="Calibri" panose="020F0502020204030204" pitchFamily="34" charset="0"/>
+                <a:cs typeface="Calibri" panose="020F0502020204030204" pitchFamily="34" charset="0"/>
+              </a:rPr>
+              <a:t>Phase rotator continuously extends period of CLK</a:t>
+            </a:r>
+            <a:r>
+              <a:rPr lang="en-CA" baseline="-25000" dirty="0">
+                <a:latin typeface="Calibri" panose="020F0502020204030204" pitchFamily="34" charset="0"/>
+                <a:cs typeface="Calibri" panose="020F0502020204030204" pitchFamily="34" charset="0"/>
+              </a:rPr>
+              <a:t>PLL</a:t>
+            </a:r>
+            <a:r>
+              <a:rPr lang="en-CA" dirty="0">
+                <a:latin typeface="Calibri" panose="020F0502020204030204" pitchFamily="34" charset="0"/>
+                <a:cs typeface="Calibri" panose="020F0502020204030204" pitchFamily="34" charset="0"/>
+              </a:rPr>
+              <a:t> to generate lower-frequency CLK</a:t>
+            </a:r>
+            <a:r>
+              <a:rPr lang="en-CA" baseline="-25000" dirty="0">
+                <a:latin typeface="Calibri" panose="020F0502020204030204" pitchFamily="34" charset="0"/>
+                <a:cs typeface="Calibri" panose="020F0502020204030204" pitchFamily="34" charset="0"/>
+              </a:rPr>
+              <a:t>SOC</a:t>
+            </a:r>
+          </a:p>
+          <a:p>
+            <a:pPr marL="285750" indent="-285750">
+              <a:buFont typeface="Arial" panose="020B0604020202020204" pitchFamily="34" charset="0"/>
+              <a:buChar char="•"/>
+            </a:pPr>
+            <a:r>
+              <a:rPr lang="en-CA" dirty="0">
+                <a:latin typeface="Calibri" panose="020F0502020204030204" pitchFamily="34" charset="0"/>
+                <a:cs typeface="Calibri" panose="020F0502020204030204" pitchFamily="34" charset="0"/>
+              </a:rPr>
+              <a:t>40-phase DLL generates desired inputs to phase rotator mux</a:t>
+            </a:r>
+          </a:p>
+          <a:p>
+            <a:pPr marL="285750" indent="-285750">
+              <a:buFont typeface="Arial" panose="020B0604020202020204" pitchFamily="34" charset="0"/>
+              <a:buChar char="•"/>
+            </a:pPr>
+            <a:r>
+              <a:rPr lang="en-CA" dirty="0">
+                <a:latin typeface="Calibri" panose="020F0502020204030204" pitchFamily="34" charset="0"/>
+                <a:cs typeface="Calibri" panose="020F0502020204030204" pitchFamily="34" charset="0"/>
+              </a:rPr>
+              <a:t>Longer actuation latency (3 clock cycles) than Hashimoto et al.</a:t>
+            </a:r>
+          </a:p>
+          <a:p>
+            <a:pPr marL="285750" indent="-285750">
+              <a:buFont typeface="Arial" panose="020B0604020202020204" pitchFamily="34" charset="0"/>
+              <a:buChar char="•"/>
+            </a:pPr>
+            <a:r>
+              <a:rPr lang="en-CA" dirty="0"/>
+              <a:t>Up to 6% V</a:t>
+            </a:r>
+            <a:r>
+              <a:rPr lang="en-CA" baseline="-25000" dirty="0"/>
+              <a:t>MIN</a:t>
+            </a:r>
+            <a:r>
+              <a:rPr lang="en-CA" dirty="0"/>
+              <a:t> reduction reported at 4 GHz</a:t>
+            </a:r>
           </a:p>
         </p:txBody>
       </p:sp>
@@ -5705,35 +6250,83 @@
           <a:bodyPr/>
           <a:lstStyle/>
           <a:p>
-            <a:endParaRPr lang="en-CA"/>
-          </a:p>
-        </p:txBody>
-      </p:sp>
-      <p:sp>
-        <p:nvSpPr>
-          <p:cNvPr id="3" name="Content Placeholder 2">
-            <a:extLst>
-              <a:ext uri="{FF2B5EF4-FFF2-40B4-BE49-F238E27FC236}">
-                <a16:creationId xmlns:a16="http://schemas.microsoft.com/office/drawing/2014/main" id="{DC0E4A1C-77D1-44B9-BC06-0931AB55AA9D}"/>
-              </a:ext>
-            </a:extLst>
-          </p:cNvPr>
-          <p:cNvSpPr>
-            <a:spLocks noGrp="1"/>
-          </p:cNvSpPr>
-          <p:nvPr>
-            <p:ph idx="1"/>
-          </p:nvPr>
-        </p:nvSpPr>
-        <p:spPr/>
-        <p:txBody>
-          <a:bodyPr/>
-          <a:lstStyle/>
-          <a:p>
-            <a:endParaRPr lang="en-CA"/>
-          </a:p>
-        </p:txBody>
-      </p:sp>
+            <a:r>
+              <a:rPr lang="en-CA" dirty="0"/>
+              <a:t>PLL-based adaptive clocking in ASAP7</a:t>
+            </a:r>
+          </a:p>
+        </p:txBody>
+      </p:sp>
+      <p:pic>
+        <p:nvPicPr>
+          <p:cNvPr id="8" name="Content Placeholder 7" descr="A screenshot of a cell phone&#10;&#10;Description automatically generated">
+            <a:extLst>
+              <a:ext uri="{FF2B5EF4-FFF2-40B4-BE49-F238E27FC236}">
+                <a16:creationId xmlns:a16="http://schemas.microsoft.com/office/drawing/2014/main" id="{6B5FA2A1-9154-496A-A473-B3E6E1A5ADBE}"/>
+              </a:ext>
+            </a:extLst>
+          </p:cNvPr>
+          <p:cNvPicPr>
+            <a:picLocks noGrp="1" noChangeAspect="1"/>
+          </p:cNvPicPr>
+          <p:nvPr>
+            <p:ph sz="half" idx="1"/>
+          </p:nvPr>
+        </p:nvPicPr>
+        <p:blipFill>
+          <a:blip r:embed="rId2">
+            <a:extLst>
+              <a:ext uri="{28A0092B-C50C-407E-A947-70E740481C1C}">
+                <a14:useLocalDpi xmlns:a14="http://schemas.microsoft.com/office/drawing/2010/main" val="0"/>
+              </a:ext>
+            </a:extLst>
+          </a:blip>
+          <a:stretch>
+            <a:fillRect/>
+          </a:stretch>
+        </p:blipFill>
+        <p:spPr>
+          <a:xfrm>
+            <a:off x="1094878" y="1402279"/>
+            <a:ext cx="4668244" cy="3901238"/>
+          </a:xfrm>
+        </p:spPr>
+      </p:pic>
+      <p:pic>
+        <p:nvPicPr>
+          <p:cNvPr id="10" name="Content Placeholder 9" descr="A screenshot of a cell phone&#10;&#10;Description automatically generated">
+            <a:extLst>
+              <a:ext uri="{FF2B5EF4-FFF2-40B4-BE49-F238E27FC236}">
+                <a16:creationId xmlns:a16="http://schemas.microsoft.com/office/drawing/2014/main" id="{F0F9B9D8-B6BF-45BD-8ACA-CECB1F17FB5E}"/>
+              </a:ext>
+            </a:extLst>
+          </p:cNvPr>
+          <p:cNvPicPr>
+            <a:picLocks noGrp="1" noChangeAspect="1"/>
+          </p:cNvPicPr>
+          <p:nvPr>
+            <p:ph sz="half" idx="2"/>
+          </p:nvPr>
+        </p:nvPicPr>
+        <p:blipFill>
+          <a:blip r:embed="rId3">
+            <a:extLst>
+              <a:ext uri="{28A0092B-C50C-407E-A947-70E740481C1C}">
+                <a14:useLocalDpi xmlns:a14="http://schemas.microsoft.com/office/drawing/2010/main" val="0"/>
+              </a:ext>
+            </a:extLst>
+          </a:blip>
+          <a:stretch>
+            <a:fillRect/>
+          </a:stretch>
+        </p:blipFill>
+        <p:spPr>
+          <a:xfrm>
+            <a:off x="6302430" y="1424373"/>
+            <a:ext cx="5051370" cy="3790548"/>
+          </a:xfrm>
+        </p:spPr>
+      </p:pic>
       <p:sp>
         <p:nvSpPr>
           <p:cNvPr id="4" name="Slide Number Placeholder 3">
@@ -5759,7 +6352,192 @@
               <a:rPr lang="en-CA" smtClean="0"/>
               <a:t>8</a:t>
             </a:fld>
-            <a:endParaRPr lang="en-CA"/>
+            <a:endParaRPr lang="en-CA" dirty="0"/>
+          </a:p>
+        </p:txBody>
+      </p:sp>
+      <p:sp>
+        <p:nvSpPr>
+          <p:cNvPr id="11" name="TextBox 10">
+            <a:extLst>
+              <a:ext uri="{FF2B5EF4-FFF2-40B4-BE49-F238E27FC236}">
+                <a16:creationId xmlns:a16="http://schemas.microsoft.com/office/drawing/2014/main" id="{4B8C08C6-FFDA-451A-96C0-59B592EE185B}"/>
+              </a:ext>
+            </a:extLst>
+          </p:cNvPr>
+          <p:cNvSpPr txBox="1"/>
+          <p:nvPr/>
+        </p:nvSpPr>
+        <p:spPr>
+          <a:xfrm>
+            <a:off x="838200" y="5282377"/>
+            <a:ext cx="5545975" cy="1200329"/>
+          </a:xfrm>
+          <a:prstGeom prst="rect">
+            <a:avLst/>
+          </a:prstGeom>
+          <a:noFill/>
+        </p:spPr>
+        <p:txBody>
+          <a:bodyPr wrap="square" rtlCol="0">
+            <a:spAutoFit/>
+          </a:bodyPr>
+          <a:lstStyle/>
+          <a:p>
+            <a:pPr marL="285750" indent="-285750">
+              <a:buFont typeface="Arial" panose="020B0604020202020204" pitchFamily="34" charset="0"/>
+              <a:buChar char="•"/>
+            </a:pPr>
+            <a:r>
+              <a:rPr lang="en-CA" dirty="0">
+                <a:latin typeface="Calibri" panose="020F0502020204030204" pitchFamily="34" charset="0"/>
+                <a:cs typeface="Calibri" panose="020F0502020204030204" pitchFamily="34" charset="0"/>
+              </a:rPr>
+              <a:t>K</a:t>
+            </a:r>
+            <a:r>
+              <a:rPr lang="en-CA" baseline="-25000" dirty="0">
+                <a:latin typeface="Calibri" panose="020F0502020204030204" pitchFamily="34" charset="0"/>
+                <a:cs typeface="Calibri" panose="020F0502020204030204" pitchFamily="34" charset="0"/>
+              </a:rPr>
+              <a:t>DCO</a:t>
+            </a:r>
+            <a:r>
+              <a:rPr lang="en-CA" dirty="0">
+                <a:latin typeface="Calibri" panose="020F0502020204030204" pitchFamily="34" charset="0"/>
+                <a:cs typeface="Calibri" panose="020F0502020204030204" pitchFamily="34" charset="0"/>
+              </a:rPr>
+              <a:t> = 60MHz/LSB (from PEX)</a:t>
+            </a:r>
+          </a:p>
+          <a:p>
+            <a:pPr marL="285750" indent="-285750">
+              <a:buFont typeface="Arial" panose="020B0604020202020204" pitchFamily="34" charset="0"/>
+              <a:buChar char="•"/>
+            </a:pPr>
+            <a:r>
+              <a:rPr lang="en-CA" dirty="0">
+                <a:latin typeface="Calibri" panose="020F0502020204030204" pitchFamily="34" charset="0"/>
+                <a:cs typeface="Calibri" panose="020F0502020204030204" pitchFamily="34" charset="0"/>
+              </a:rPr>
+              <a:t>K</a:t>
+            </a:r>
+            <a:r>
+              <a:rPr lang="en-CA" baseline="-25000" dirty="0">
+                <a:latin typeface="Calibri" panose="020F0502020204030204" pitchFamily="34" charset="0"/>
+                <a:cs typeface="Calibri" panose="020F0502020204030204" pitchFamily="34" charset="0"/>
+              </a:rPr>
+              <a:t>P</a:t>
+            </a:r>
+            <a:r>
+              <a:rPr lang="en-CA" dirty="0">
+                <a:latin typeface="Calibri" panose="020F0502020204030204" pitchFamily="34" charset="0"/>
+                <a:cs typeface="Calibri" panose="020F0502020204030204" pitchFamily="34" charset="0"/>
+              </a:rPr>
+              <a:t> = 2</a:t>
+            </a:r>
+            <a:r>
+              <a:rPr lang="en-CA" baseline="30000" dirty="0">
+                <a:latin typeface="Calibri" panose="020F0502020204030204" pitchFamily="34" charset="0"/>
+                <a:cs typeface="Calibri" panose="020F0502020204030204" pitchFamily="34" charset="0"/>
+              </a:rPr>
+              <a:t>0</a:t>
+            </a:r>
+            <a:r>
+              <a:rPr lang="en-CA" dirty="0">
+                <a:latin typeface="Calibri" panose="020F0502020204030204" pitchFamily="34" charset="0"/>
+                <a:cs typeface="Calibri" panose="020F0502020204030204" pitchFamily="34" charset="0"/>
+              </a:rPr>
+              <a:t>, K</a:t>
+            </a:r>
+            <a:r>
+              <a:rPr lang="en-CA" baseline="-25000" dirty="0">
+                <a:latin typeface="Calibri" panose="020F0502020204030204" pitchFamily="34" charset="0"/>
+                <a:cs typeface="Calibri" panose="020F0502020204030204" pitchFamily="34" charset="0"/>
+              </a:rPr>
+              <a:t>I</a:t>
+            </a:r>
+            <a:r>
+              <a:rPr lang="en-CA" dirty="0">
+                <a:latin typeface="Calibri" panose="020F0502020204030204" pitchFamily="34" charset="0"/>
+                <a:cs typeface="Calibri" panose="020F0502020204030204" pitchFamily="34" charset="0"/>
+              </a:rPr>
+              <a:t> = 2</a:t>
+            </a:r>
+            <a:r>
+              <a:rPr lang="en-CA" baseline="30000" dirty="0">
+                <a:latin typeface="Calibri" panose="020F0502020204030204" pitchFamily="34" charset="0"/>
+                <a:cs typeface="Calibri" panose="020F0502020204030204" pitchFamily="34" charset="0"/>
+              </a:rPr>
+              <a:t>-9</a:t>
+            </a:r>
+          </a:p>
+          <a:p>
+            <a:pPr marL="285750" indent="-285750">
+              <a:buFont typeface="Arial" panose="020B0604020202020204" pitchFamily="34" charset="0"/>
+              <a:buChar char="•"/>
+            </a:pPr>
+            <a:r>
+              <a:rPr lang="en-CA" dirty="0">
+                <a:latin typeface="Calibri" panose="020F0502020204030204" pitchFamily="34" charset="0"/>
+                <a:cs typeface="Calibri" panose="020F0502020204030204" pitchFamily="34" charset="0"/>
+              </a:rPr>
+              <a:t>BW = 810kHz, PM = 79°</a:t>
+            </a:r>
+          </a:p>
+          <a:p>
+            <a:pPr marL="285750" indent="-285750">
+              <a:buFont typeface="Arial" panose="020B0604020202020204" pitchFamily="34" charset="0"/>
+              <a:buChar char="•"/>
+            </a:pPr>
+            <a:r>
+              <a:rPr lang="en-CA" dirty="0">
+                <a:latin typeface="Calibri" panose="020F0502020204030204" pitchFamily="34" charset="0"/>
+                <a:cs typeface="Calibri" panose="020F0502020204030204" pitchFamily="34" charset="0"/>
+              </a:rPr>
+              <a:t>Logic latency = 40ps, DCO latency = 171ps (from PEX)</a:t>
+            </a:r>
+            <a:endParaRPr lang="en-CA" dirty="0"/>
+          </a:p>
+        </p:txBody>
+      </p:sp>
+      <p:sp>
+        <p:nvSpPr>
+          <p:cNvPr id="12" name="TextBox 11">
+            <a:extLst>
+              <a:ext uri="{FF2B5EF4-FFF2-40B4-BE49-F238E27FC236}">
+                <a16:creationId xmlns:a16="http://schemas.microsoft.com/office/drawing/2014/main" id="{30A0254E-775E-44B7-989A-D9C3C4C35CD1}"/>
+              </a:ext>
+            </a:extLst>
+          </p:cNvPr>
+          <p:cNvSpPr txBox="1"/>
+          <p:nvPr/>
+        </p:nvSpPr>
+        <p:spPr>
+          <a:xfrm>
+            <a:off x="6590605" y="5214921"/>
+            <a:ext cx="4357257" cy="646331"/>
+          </a:xfrm>
+          <a:prstGeom prst="rect">
+            <a:avLst/>
+          </a:prstGeom>
+          <a:noFill/>
+        </p:spPr>
+        <p:txBody>
+          <a:bodyPr wrap="square" rtlCol="0">
+            <a:spAutoFit/>
+          </a:bodyPr>
+          <a:lstStyle/>
+          <a:p>
+            <a:pPr algn="ctr"/>
+            <a:r>
+              <a:rPr lang="en-CA" dirty="0">
+                <a:latin typeface="Calibri" panose="020F0502020204030204" pitchFamily="34" charset="0"/>
+                <a:cs typeface="Calibri" panose="020F0502020204030204" pitchFamily="34" charset="0"/>
+              </a:rPr>
+              <a:t>System-level simulation (MATLAB) with critical delays back-annotated from PEX</a:t>
+            </a:r>
+            <a:endParaRPr lang="en-CA" dirty="0"/>
           </a:p>
         </p:txBody>
       </p:sp>
@@ -5793,6 +6571,41 @@
           <a:chExt cx="0" cy="0"/>
         </a:xfrm>
       </p:grpSpPr>
+      <p:pic>
+        <p:nvPicPr>
+          <p:cNvPr id="13" name="Content Placeholder 7">
+            <a:extLst>
+              <a:ext uri="{FF2B5EF4-FFF2-40B4-BE49-F238E27FC236}">
+                <a16:creationId xmlns:a16="http://schemas.microsoft.com/office/drawing/2014/main" id="{12D153A0-D9A9-4BAC-9FAC-F55523106638}"/>
+              </a:ext>
+            </a:extLst>
+          </p:cNvPr>
+          <p:cNvPicPr>
+            <a:picLocks noChangeAspect="1"/>
+          </p:cNvPicPr>
+          <p:nvPr/>
+        </p:nvPicPr>
+        <p:blipFill>
+          <a:blip r:embed="rId2">
+            <a:extLst>
+              <a:ext uri="{28A0092B-C50C-407E-A947-70E740481C1C}">
+                <a14:useLocalDpi xmlns:a14="http://schemas.microsoft.com/office/drawing/2010/main" val="0"/>
+              </a:ext>
+            </a:extLst>
+          </a:blip>
+          <a:srcRect/>
+          <a:stretch/>
+        </p:blipFill>
+        <p:spPr>
+          <a:xfrm>
+            <a:off x="7525792" y="3861074"/>
+            <a:ext cx="3699162" cy="2773314"/>
+          </a:xfrm>
+          <a:prstGeom prst="rect">
+            <a:avLst/>
+          </a:prstGeom>
+        </p:spPr>
+      </p:pic>
       <p:sp>
         <p:nvSpPr>
           <p:cNvPr id="2" name="Title 1">
@@ -5814,35 +6627,83 @@
           <a:bodyPr/>
           <a:lstStyle/>
           <a:p>
-            <a:endParaRPr lang="en-CA"/>
-          </a:p>
-        </p:txBody>
-      </p:sp>
-      <p:sp>
-        <p:nvSpPr>
-          <p:cNvPr id="3" name="Content Placeholder 2">
-            <a:extLst>
-              <a:ext uri="{FF2B5EF4-FFF2-40B4-BE49-F238E27FC236}">
-                <a16:creationId xmlns:a16="http://schemas.microsoft.com/office/drawing/2014/main" id="{9BD34813-9064-4E68-8377-18AC3FA13FE9}"/>
-              </a:ext>
-            </a:extLst>
-          </p:cNvPr>
-          <p:cNvSpPr>
-            <a:spLocks noGrp="1"/>
-          </p:cNvSpPr>
-          <p:nvPr>
-            <p:ph idx="1"/>
-          </p:nvPr>
-        </p:nvSpPr>
-        <p:spPr/>
-        <p:txBody>
-          <a:bodyPr/>
-          <a:lstStyle/>
-          <a:p>
-            <a:endParaRPr lang="en-CA"/>
-          </a:p>
-        </p:txBody>
-      </p:sp>
+            <a:r>
+              <a:rPr lang="en-CA" dirty="0"/>
+              <a:t>C2MOS DCO Implementation</a:t>
+            </a:r>
+          </a:p>
+        </p:txBody>
+      </p:sp>
+      <p:pic>
+        <p:nvPicPr>
+          <p:cNvPr id="8" name="Content Placeholder 7" descr="A close up of a logo&#10;&#10;Description automatically generated">
+            <a:extLst>
+              <a:ext uri="{FF2B5EF4-FFF2-40B4-BE49-F238E27FC236}">
+                <a16:creationId xmlns:a16="http://schemas.microsoft.com/office/drawing/2014/main" id="{5ED03B6C-95BE-447C-AA05-E1EA3AFA04D7}"/>
+              </a:ext>
+            </a:extLst>
+          </p:cNvPr>
+          <p:cNvPicPr>
+            <a:picLocks noGrp="1" noChangeAspect="1"/>
+          </p:cNvPicPr>
+          <p:nvPr>
+            <p:ph sz="half" idx="1"/>
+          </p:nvPr>
+        </p:nvPicPr>
+        <p:blipFill>
+          <a:blip r:embed="rId3">
+            <a:extLst>
+              <a:ext uri="{28A0092B-C50C-407E-A947-70E740481C1C}">
+                <a14:useLocalDpi xmlns:a14="http://schemas.microsoft.com/office/drawing/2010/main" val="0"/>
+              </a:ext>
+            </a:extLst>
+          </a:blip>
+          <a:stretch>
+            <a:fillRect/>
+          </a:stretch>
+        </p:blipFill>
+        <p:spPr>
+          <a:xfrm>
+            <a:off x="818457" y="1634184"/>
+            <a:ext cx="4364180" cy="2075334"/>
+          </a:xfrm>
+        </p:spPr>
+      </p:pic>
+      <p:pic>
+        <p:nvPicPr>
+          <p:cNvPr id="10" name="Content Placeholder 9" descr="A picture containing clock&#10;&#10;Description automatically generated">
+            <a:extLst>
+              <a:ext uri="{FF2B5EF4-FFF2-40B4-BE49-F238E27FC236}">
+                <a16:creationId xmlns:a16="http://schemas.microsoft.com/office/drawing/2014/main" id="{E96421F9-982A-4857-9F20-DBA8101346D5}"/>
+              </a:ext>
+            </a:extLst>
+          </p:cNvPr>
+          <p:cNvPicPr>
+            <a:picLocks noGrp="1" noChangeAspect="1"/>
+          </p:cNvPicPr>
+          <p:nvPr>
+            <p:ph sz="half" idx="2"/>
+          </p:nvPr>
+        </p:nvPicPr>
+        <p:blipFill>
+          <a:blip r:embed="rId4">
+            <a:extLst>
+              <a:ext uri="{28A0092B-C50C-407E-A947-70E740481C1C}">
+                <a14:useLocalDpi xmlns:a14="http://schemas.microsoft.com/office/drawing/2010/main" val="0"/>
+              </a:ext>
+            </a:extLst>
+          </a:blip>
+          <a:stretch>
+            <a:fillRect/>
+          </a:stretch>
+        </p:blipFill>
+        <p:spPr>
+          <a:xfrm>
+            <a:off x="6113318" y="1668459"/>
+            <a:ext cx="2381596" cy="2015698"/>
+          </a:xfrm>
+        </p:spPr>
+      </p:pic>
       <p:sp>
         <p:nvSpPr>
           <p:cNvPr id="4" name="Slide Number Placeholder 3">
@@ -5869,6 +6730,136 @@
               <a:t>9</a:t>
             </a:fld>
             <a:endParaRPr lang="en-CA"/>
+          </a:p>
+        </p:txBody>
+      </p:sp>
+      <p:pic>
+        <p:nvPicPr>
+          <p:cNvPr id="11" name="Content Placeholder 9">
+            <a:extLst>
+              <a:ext uri="{FF2B5EF4-FFF2-40B4-BE49-F238E27FC236}">
+                <a16:creationId xmlns:a16="http://schemas.microsoft.com/office/drawing/2014/main" id="{3E05312F-29DA-43A9-90AB-A1CC2B68FC18}"/>
+              </a:ext>
+            </a:extLst>
+          </p:cNvPr>
+          <p:cNvPicPr>
+            <a:picLocks noChangeAspect="1"/>
+          </p:cNvPicPr>
+          <p:nvPr/>
+        </p:nvPicPr>
+        <p:blipFill>
+          <a:blip r:embed="rId5">
+            <a:extLst>
+              <a:ext uri="{28A0092B-C50C-407E-A947-70E740481C1C}">
+                <a14:useLocalDpi xmlns:a14="http://schemas.microsoft.com/office/drawing/2010/main" val="0"/>
+              </a:ext>
+            </a:extLst>
+          </a:blip>
+          <a:srcRect/>
+          <a:stretch/>
+        </p:blipFill>
+        <p:spPr>
+          <a:xfrm>
+            <a:off x="8815648" y="1814379"/>
+            <a:ext cx="2381596" cy="1767442"/>
+          </a:xfrm>
+          <a:prstGeom prst="rect">
+            <a:avLst/>
+          </a:prstGeom>
+        </p:spPr>
+      </p:pic>
+      <p:pic>
+        <p:nvPicPr>
+          <p:cNvPr id="12" name="Content Placeholder 7">
+            <a:extLst>
+              <a:ext uri="{FF2B5EF4-FFF2-40B4-BE49-F238E27FC236}">
+                <a16:creationId xmlns:a16="http://schemas.microsoft.com/office/drawing/2014/main" id="{85E6C560-D265-4F4C-8D74-5AF9169D9970}"/>
+              </a:ext>
+            </a:extLst>
+          </p:cNvPr>
+          <p:cNvPicPr>
+            <a:picLocks noChangeAspect="1"/>
+          </p:cNvPicPr>
+          <p:nvPr/>
+        </p:nvPicPr>
+        <p:blipFill>
+          <a:blip r:embed="rId6">
+            <a:extLst>
+              <a:ext uri="{28A0092B-C50C-407E-A947-70E740481C1C}">
+                <a14:useLocalDpi xmlns:a14="http://schemas.microsoft.com/office/drawing/2010/main" val="0"/>
+              </a:ext>
+            </a:extLst>
+          </a:blip>
+          <a:srcRect/>
+          <a:stretch/>
+        </p:blipFill>
+        <p:spPr>
+          <a:xfrm>
+            <a:off x="1271849" y="3861074"/>
+            <a:ext cx="3699162" cy="2773316"/>
+          </a:xfrm>
+          <a:prstGeom prst="rect">
+            <a:avLst/>
+          </a:prstGeom>
+        </p:spPr>
+      </p:pic>
+      <p:sp>
+        <p:nvSpPr>
+          <p:cNvPr id="14" name="TextBox 13">
+            <a:extLst>
+              <a:ext uri="{FF2B5EF4-FFF2-40B4-BE49-F238E27FC236}">
+                <a16:creationId xmlns:a16="http://schemas.microsoft.com/office/drawing/2014/main" id="{8DC685A6-BC59-49A2-88CD-B59B7DFC8584}"/>
+              </a:ext>
+            </a:extLst>
+          </p:cNvPr>
+          <p:cNvSpPr txBox="1"/>
+          <p:nvPr/>
+        </p:nvSpPr>
+        <p:spPr>
+          <a:xfrm>
+            <a:off x="4539439" y="4727876"/>
+            <a:ext cx="3110345" cy="923330"/>
+          </a:xfrm>
+          <a:prstGeom prst="rect">
+            <a:avLst/>
+          </a:prstGeom>
+          <a:noFill/>
+        </p:spPr>
+        <p:txBody>
+          <a:bodyPr wrap="square" rtlCol="0">
+            <a:spAutoFit/>
+          </a:bodyPr>
+          <a:lstStyle/>
+          <a:p>
+            <a:pPr algn="ctr"/>
+            <a:r>
+              <a:rPr lang="en-CA" dirty="0">
+                <a:latin typeface="Calibri" panose="020F0502020204030204" pitchFamily="34" charset="0"/>
+                <a:cs typeface="Calibri" panose="020F0502020204030204" pitchFamily="34" charset="0"/>
+              </a:rPr>
+              <a:t>4-bit coarse DAC (initial lock)</a:t>
+            </a:r>
+          </a:p>
+          <a:p>
+            <a:pPr algn="ctr"/>
+            <a:r>
+              <a:rPr lang="en-CA" dirty="0">
+                <a:latin typeface="Calibri" panose="020F0502020204030204" pitchFamily="34" charset="0"/>
+                <a:cs typeface="Calibri" panose="020F0502020204030204" pitchFamily="34" charset="0"/>
+              </a:rPr>
+              <a:t>4-bit fine DAC (PLL)</a:t>
+            </a:r>
+          </a:p>
+          <a:p>
+            <a:pPr algn="ctr"/>
+            <a:r>
+              <a:rPr lang="en-CA" dirty="0">
+                <a:latin typeface="Calibri" panose="020F0502020204030204" pitchFamily="34" charset="0"/>
+                <a:cs typeface="Calibri" panose="020F0502020204030204" pitchFamily="34" charset="0"/>
+              </a:rPr>
+              <a:t>3-bit droop DAC </a:t>
+            </a:r>
+            <a:endParaRPr lang="en-CA" dirty="0"/>
           </a:p>
         </p:txBody>
       </p:sp>

</xml_diff>